<commit_message>
updates to analysis AND addition of line to init_task to clear all parallel cluster jbos
</commit_message>
<xml_diff>
--- a/analysis2/figs/day5_summary.pptx
+++ b/analysis2/figs/day5_summary.pptx
@@ -12,6 +12,10 @@
     <p:sldId id="260" r:id="rId6"/>
     <p:sldId id="261" r:id="rId7"/>
     <p:sldId id="262" r:id="rId8"/>
+    <p:sldId id="265" r:id="rId9"/>
+    <p:sldId id="266" r:id="rId10"/>
+    <p:sldId id="267" r:id="rId11"/>
+    <p:sldId id="264" r:id="rId12"/>
   </p:sldIdLst>
   <p:sldSz cx="12192000" cy="6858000"/>
   <p:notesSz cx="6858000" cy="9144000"/>
@@ -110,6 +114,11 @@
       </a:defRPr>
     </a:lvl9pPr>
   </p:defaultTextStyle>
+  <p:extLst>
+    <p:ext uri="{EFAFB233-063F-42B5-8137-9DF3F51BA10A}">
+      <p15:sldGuideLst xmlns:p15="http://schemas.microsoft.com/office/powerpoint/2012/main"/>
+    </p:ext>
+  </p:extLst>
 </p:presentation>
 </file>
 
@@ -158,7 +167,6 @@
               <a:rPr lang="en-US"/>
               <a:t>Click to edit Master title style</a:t>
             </a:r>
-            <a:endParaRPr lang="en-US"/>
           </a:p>
         </p:txBody>
       </p:sp>
@@ -223,7 +231,6 @@
               <a:rPr lang="en-US"/>
               <a:t>Click to edit Master subtitle style</a:t>
             </a:r>
-            <a:endParaRPr lang="en-US"/>
           </a:p>
         </p:txBody>
       </p:sp>
@@ -341,7 +348,6 @@
               <a:rPr lang="en-US"/>
               <a:t>Click to edit Master title style</a:t>
             </a:r>
-            <a:endParaRPr lang="en-US"/>
           </a:p>
         </p:txBody>
       </p:sp>
@@ -393,7 +399,6 @@
               <a:rPr lang="en-US"/>
               <a:t>Fifth level</a:t>
             </a:r>
-            <a:endParaRPr lang="en-US"/>
           </a:p>
         </p:txBody>
       </p:sp>
@@ -516,7 +521,6 @@
               <a:rPr lang="en-US"/>
               <a:t>Click to edit Master title style</a:t>
             </a:r>
-            <a:endParaRPr lang="en-US"/>
           </a:p>
         </p:txBody>
       </p:sp>
@@ -573,7 +577,6 @@
               <a:rPr lang="en-US"/>
               <a:t>Fifth level</a:t>
             </a:r>
-            <a:endParaRPr lang="en-US"/>
           </a:p>
         </p:txBody>
       </p:sp>
@@ -691,7 +694,6 @@
               <a:rPr lang="en-US"/>
               <a:t>Click to edit Master title style</a:t>
             </a:r>
-            <a:endParaRPr lang="en-US"/>
           </a:p>
         </p:txBody>
       </p:sp>
@@ -743,7 +745,6 @@
               <a:rPr lang="en-US"/>
               <a:t>Fifth level</a:t>
             </a:r>
-            <a:endParaRPr lang="en-US"/>
           </a:p>
         </p:txBody>
       </p:sp>
@@ -870,7 +871,6 @@
               <a:rPr lang="en-US"/>
               <a:t>Click to edit Master title style</a:t>
             </a:r>
-            <a:endParaRPr lang="en-US"/>
           </a:p>
         </p:txBody>
       </p:sp>
@@ -1107,7 +1107,6 @@
               <a:rPr lang="en-US"/>
               <a:t>Click to edit Master title style</a:t>
             </a:r>
-            <a:endParaRPr lang="en-US"/>
           </a:p>
         </p:txBody>
       </p:sp>
@@ -1164,7 +1163,6 @@
               <a:rPr lang="en-US"/>
               <a:t>Fifth level</a:t>
             </a:r>
-            <a:endParaRPr lang="en-US"/>
           </a:p>
         </p:txBody>
       </p:sp>
@@ -1221,7 +1219,6 @@
               <a:rPr lang="en-US"/>
               <a:t>Fifth level</a:t>
             </a:r>
-            <a:endParaRPr lang="en-US"/>
           </a:p>
         </p:txBody>
       </p:sp>
@@ -1344,7 +1341,6 @@
               <a:rPr lang="en-US"/>
               <a:t>Click to edit Master title style</a:t>
             </a:r>
-            <a:endParaRPr lang="en-US"/>
           </a:p>
         </p:txBody>
       </p:sp>
@@ -1466,7 +1462,6 @@
               <a:rPr lang="en-US"/>
               <a:t>Fifth level</a:t>
             </a:r>
-            <a:endParaRPr lang="en-US"/>
           </a:p>
         </p:txBody>
       </p:sp>
@@ -1588,7 +1583,6 @@
               <a:rPr lang="en-US"/>
               <a:t>Fifth level</a:t>
             </a:r>
-            <a:endParaRPr lang="en-US"/>
           </a:p>
         </p:txBody>
       </p:sp>
@@ -1706,7 +1700,6 @@
               <a:rPr lang="en-US"/>
               <a:t>Click to edit Master title style</a:t>
             </a:r>
-            <a:endParaRPr lang="en-US"/>
           </a:p>
         </p:txBody>
       </p:sp>
@@ -1928,7 +1921,6 @@
               <a:rPr lang="en-US"/>
               <a:t>Click to edit Master title style</a:t>
             </a:r>
-            <a:endParaRPr lang="en-US"/>
           </a:p>
         </p:txBody>
       </p:sp>
@@ -2013,7 +2005,6 @@
               <a:rPr lang="en-US"/>
               <a:t>Fifth level</a:t>
             </a:r>
-            <a:endParaRPr lang="en-US"/>
           </a:p>
         </p:txBody>
       </p:sp>
@@ -2205,7 +2196,6 @@
               <a:rPr lang="en-US"/>
               <a:t>Click to edit Master title style</a:t>
             </a:r>
-            <a:endParaRPr lang="en-US"/>
           </a:p>
         </p:txBody>
       </p:sp>
@@ -2464,7 +2454,6 @@
               <a:rPr lang="en-US"/>
               <a:t>Click to edit Master title style</a:t>
             </a:r>
-            <a:endParaRPr lang="en-US"/>
           </a:p>
         </p:txBody>
       </p:sp>
@@ -2526,7 +2515,6 @@
               <a:rPr lang="en-US"/>
               <a:t>Fifth level</a:t>
             </a:r>
-            <a:endParaRPr lang="en-US"/>
           </a:p>
         </p:txBody>
       </p:sp>
@@ -3027,6 +3015,504 @@
 </p:sld>
 </file>
 
+<file path=ppt/slides/slide10.xml><?xml version="1.0" encoding="utf-8"?>
+<p:sld xmlns:a="http://schemas.openxmlformats.org/drawingml/2006/main" xmlns:r="http://schemas.openxmlformats.org/officeDocument/2006/relationships" xmlns:p="http://schemas.openxmlformats.org/presentationml/2006/main">
+  <p:cSld>
+    <p:spTree>
+      <p:nvGrpSpPr>
+        <p:cNvPr id="1" name=""/>
+        <p:cNvGrpSpPr/>
+        <p:nvPr/>
+      </p:nvGrpSpPr>
+      <p:grpSpPr>
+        <a:xfrm>
+          <a:off x="0" y="0"/>
+          <a:ext cx="0" cy="0"/>
+          <a:chOff x="0" y="0"/>
+          <a:chExt cx="0" cy="0"/>
+        </a:xfrm>
+      </p:grpSpPr>
+      <p:sp>
+        <p:nvSpPr>
+          <p:cNvPr id="2" name="Title 1"/>
+          <p:cNvSpPr>
+            <a:spLocks noGrp="1"/>
+          </p:cNvSpPr>
+          <p:nvPr>
+            <p:ph type="title"/>
+          </p:nvPr>
+        </p:nvSpPr>
+        <p:spPr>
+          <a:xfrm>
+            <a:off x="798444" y="192846"/>
+            <a:ext cx="10515600" cy="1325563"/>
+          </a:xfrm>
+        </p:spPr>
+        <p:txBody>
+          <a:bodyPr/>
+          <a:lstStyle/>
+          <a:p>
+            <a:r>
+              <a:rPr lang="en-US" dirty="0"/>
+              <a:t>STN Mean Power vs. M1 Power</a:t>
+            </a:r>
+          </a:p>
+        </p:txBody>
+      </p:sp>
+      <p:sp>
+        <p:nvSpPr>
+          <p:cNvPr id="9" name="TextBox 8"/>
+          <p:cNvSpPr txBox="1"/>
+          <p:nvPr/>
+        </p:nvSpPr>
+        <p:spPr>
+          <a:xfrm>
+            <a:off x="1434545" y="5418432"/>
+            <a:ext cx="7885300" cy="1200329"/>
+          </a:xfrm>
+          <a:prstGeom prst="rect">
+            <a:avLst/>
+          </a:prstGeom>
+          <a:noFill/>
+        </p:spPr>
+        <p:txBody>
+          <a:bodyPr wrap="none" rtlCol="0">
+            <a:spAutoFit/>
+          </a:bodyPr>
+          <a:lstStyle/>
+          <a:p>
+            <a:pPr marL="285750" indent="-285750">
+              <a:buFontTx/>
+              <a:buChar char="-"/>
+            </a:pPr>
+            <a:r>
+              <a:rPr lang="en-US" dirty="0"/>
+              <a:t>Each point represents 2.5 minutes</a:t>
+            </a:r>
+          </a:p>
+          <a:p>
+            <a:pPr marL="285750" indent="-285750">
+              <a:buFontTx/>
+              <a:buChar char="-"/>
+            </a:pPr>
+            <a:r>
+              <a:rPr lang="en-US" dirty="0"/>
+              <a:t>High STN beta power and High STN variance is correlated with lower M1 power</a:t>
+            </a:r>
+          </a:p>
+          <a:p>
+            <a:pPr marL="285750" indent="-285750">
+              <a:buFontTx/>
+              <a:buChar char="-"/>
+            </a:pPr>
+            <a:r>
+              <a:rPr lang="en-US" dirty="0"/>
+              <a:t>Lower M1 power  correlated with time to target (lowest target is harder)</a:t>
+            </a:r>
+          </a:p>
+          <a:p>
+            <a:pPr marL="285750" indent="-285750">
+              <a:buFontTx/>
+              <a:buChar char="-"/>
+            </a:pPr>
+            <a:endParaRPr lang="en-US" dirty="0"/>
+          </a:p>
+        </p:txBody>
+      </p:sp>
+      <p:pic>
+        <p:nvPicPr>
+          <p:cNvPr id="3" name="Picture 2"/>
+          <p:cNvPicPr>
+            <a:picLocks noChangeAspect="1"/>
+          </p:cNvPicPr>
+          <p:nvPr/>
+        </p:nvPicPr>
+        <p:blipFill>
+          <a:blip r:embed="rId2">
+            <a:extLst>
+              <a:ext uri="{28A0092B-C50C-407E-A947-70E740481C1C}">
+                <a14:useLocalDpi xmlns:a14="http://schemas.microsoft.com/office/drawing/2010/main" val="0"/>
+              </a:ext>
+            </a:extLst>
+          </a:blip>
+          <a:stretch>
+            <a:fillRect/>
+          </a:stretch>
+        </p:blipFill>
+        <p:spPr>
+          <a:xfrm>
+            <a:off x="601585" y="1216965"/>
+            <a:ext cx="5333333" cy="4000000"/>
+          </a:xfrm>
+          <a:prstGeom prst="rect">
+            <a:avLst/>
+          </a:prstGeom>
+        </p:spPr>
+      </p:pic>
+      <p:pic>
+        <p:nvPicPr>
+          <p:cNvPr id="4" name="Picture 3"/>
+          <p:cNvPicPr>
+            <a:picLocks noChangeAspect="1"/>
+          </p:cNvPicPr>
+          <p:nvPr/>
+        </p:nvPicPr>
+        <p:blipFill>
+          <a:blip r:embed="rId3">
+            <a:extLst>
+              <a:ext uri="{28A0092B-C50C-407E-A947-70E740481C1C}">
+                <a14:useLocalDpi xmlns:a14="http://schemas.microsoft.com/office/drawing/2010/main" val="0"/>
+              </a:ext>
+            </a:extLst>
+          </a:blip>
+          <a:stretch>
+            <a:fillRect/>
+          </a:stretch>
+        </p:blipFill>
+        <p:spPr>
+          <a:xfrm>
+            <a:off x="5934918" y="1216965"/>
+            <a:ext cx="5333333" cy="4000000"/>
+          </a:xfrm>
+          <a:prstGeom prst="rect">
+            <a:avLst/>
+          </a:prstGeom>
+        </p:spPr>
+      </p:pic>
+    </p:spTree>
+    <p:extLst>
+      <p:ext uri="{BB962C8B-B14F-4D97-AF65-F5344CB8AC3E}">
+        <p14:creationId xmlns:p14="http://schemas.microsoft.com/office/powerpoint/2010/main" val="1694646506"/>
+      </p:ext>
+    </p:extLst>
+  </p:cSld>
+  <p:clrMapOvr>
+    <a:masterClrMapping/>
+  </p:clrMapOvr>
+</p:sld>
+</file>
+
+<file path=ppt/slides/slide11.xml><?xml version="1.0" encoding="utf-8"?>
+<p:sld xmlns:a="http://schemas.openxmlformats.org/drawingml/2006/main" xmlns:r="http://schemas.openxmlformats.org/officeDocument/2006/relationships" xmlns:p="http://schemas.openxmlformats.org/presentationml/2006/main">
+  <p:cSld>
+    <p:spTree>
+      <p:nvGrpSpPr>
+        <p:cNvPr id="1" name=""/>
+        <p:cNvGrpSpPr/>
+        <p:nvPr/>
+      </p:nvGrpSpPr>
+      <p:grpSpPr>
+        <a:xfrm>
+          <a:off x="0" y="0"/>
+          <a:ext cx="0" cy="0"/>
+          <a:chOff x="0" y="0"/>
+          <a:chExt cx="0" cy="0"/>
+        </a:xfrm>
+      </p:grpSpPr>
+      <p:sp>
+        <p:nvSpPr>
+          <p:cNvPr id="2" name="Title 1"/>
+          <p:cNvSpPr>
+            <a:spLocks noGrp="1"/>
+          </p:cNvSpPr>
+          <p:nvPr>
+            <p:ph type="title"/>
+          </p:nvPr>
+        </p:nvSpPr>
+        <p:spPr/>
+        <p:txBody>
+          <a:bodyPr/>
+          <a:lstStyle/>
+          <a:p>
+            <a:r>
+              <a:rPr lang="en-US" dirty="0"/>
+              <a:t>Kinematics:</a:t>
+            </a:r>
+          </a:p>
+        </p:txBody>
+      </p:sp>
+      <p:pic>
+        <p:nvPicPr>
+          <p:cNvPr id="6" name="Content Placeholder 5"/>
+          <p:cNvPicPr>
+            <a:picLocks noGrp="1" noChangeAspect="1"/>
+          </p:cNvPicPr>
+          <p:nvPr>
+            <p:ph idx="1"/>
+          </p:nvPr>
+        </p:nvPicPr>
+        <p:blipFill rotWithShape="1">
+          <a:blip r:embed="rId2">
+            <a:extLst>
+              <a:ext uri="{28A0092B-C50C-407E-A947-70E740481C1C}">
+                <a14:useLocalDpi xmlns:a14="http://schemas.microsoft.com/office/drawing/2010/main" val="0"/>
+              </a:ext>
+            </a:extLst>
+          </a:blip>
+          <a:srcRect b="72822"/>
+          <a:stretch/>
+        </p:blipFill>
+        <p:spPr>
+          <a:xfrm>
+            <a:off x="4112666" y="2796207"/>
+            <a:ext cx="7481255" cy="2875007"/>
+          </a:xfrm>
+        </p:spPr>
+      </p:pic>
+      <p:grpSp>
+        <p:nvGrpSpPr>
+          <p:cNvPr id="14" name="Group 13"/>
+          <p:cNvGrpSpPr/>
+          <p:nvPr/>
+        </p:nvGrpSpPr>
+        <p:grpSpPr>
+          <a:xfrm>
+            <a:off x="166828" y="2994990"/>
+            <a:ext cx="4225764" cy="3548185"/>
+            <a:chOff x="590897" y="2107095"/>
+            <a:chExt cx="4225764" cy="3548185"/>
+          </a:xfrm>
+        </p:grpSpPr>
+        <p:pic>
+          <p:nvPicPr>
+            <p:cNvPr id="8" name="Picture 7"/>
+            <p:cNvPicPr>
+              <a:picLocks noChangeAspect="1"/>
+            </p:cNvPicPr>
+            <p:nvPr/>
+          </p:nvPicPr>
+          <p:blipFill>
+            <a:blip r:embed="rId3">
+              <a:extLst>
+                <a:ext uri="{28A0092B-C50C-407E-A947-70E740481C1C}">
+                  <a14:useLocalDpi xmlns:a14="http://schemas.microsoft.com/office/drawing/2010/main" val="0"/>
+                </a:ext>
+              </a:extLst>
+            </a:blip>
+            <a:stretch>
+              <a:fillRect/>
+            </a:stretch>
+          </p:blipFill>
+          <p:spPr>
+            <a:xfrm>
+              <a:off x="590897" y="2107095"/>
+              <a:ext cx="4225764" cy="3548185"/>
+            </a:xfrm>
+            <a:prstGeom prst="rect">
+              <a:avLst/>
+            </a:prstGeom>
+          </p:spPr>
+        </p:pic>
+        <p:cxnSp>
+          <p:nvCxnSpPr>
+            <p:cNvPr id="10" name="Straight Connector 9"/>
+            <p:cNvCxnSpPr>
+              <a:cxnSpLocks/>
+            </p:cNvCxnSpPr>
+            <p:nvPr/>
+          </p:nvCxnSpPr>
+          <p:spPr>
+            <a:xfrm>
+              <a:off x="1484243" y="2343528"/>
+              <a:ext cx="13252" cy="2904333"/>
+            </a:xfrm>
+            <a:prstGeom prst="line">
+              <a:avLst/>
+            </a:prstGeom>
+            <a:ln w="25400">
+              <a:solidFill>
+                <a:srgbClr val="FF0000"/>
+              </a:solidFill>
+            </a:ln>
+          </p:spPr>
+          <p:style>
+            <a:lnRef idx="1">
+              <a:schemeClr val="accent1"/>
+            </a:lnRef>
+            <a:fillRef idx="0">
+              <a:schemeClr val="accent1"/>
+            </a:fillRef>
+            <a:effectRef idx="0">
+              <a:schemeClr val="accent1"/>
+            </a:effectRef>
+            <a:fontRef idx="minor">
+              <a:schemeClr val="tx1"/>
+            </a:fontRef>
+          </p:style>
+        </p:cxnSp>
+        <p:sp>
+          <p:nvSpPr>
+            <p:cNvPr id="12" name="TextBox 11"/>
+            <p:cNvSpPr txBox="1"/>
+            <p:nvPr/>
+          </p:nvSpPr>
+          <p:spPr>
+            <a:xfrm>
+              <a:off x="2267156" y="2343528"/>
+              <a:ext cx="1552926" cy="369332"/>
+            </a:xfrm>
+            <a:prstGeom prst="rect">
+              <a:avLst/>
+            </a:prstGeom>
+            <a:noFill/>
+          </p:spPr>
+          <p:txBody>
+            <a:bodyPr wrap="none" rtlCol="0">
+              <a:spAutoFit/>
+            </a:bodyPr>
+            <a:lstStyle/>
+            <a:p>
+              <a:r>
+                <a:rPr lang="en-US" dirty="0"/>
+                <a:t>Finger Tapping</a:t>
+              </a:r>
+            </a:p>
+          </p:txBody>
+        </p:sp>
+        <p:sp>
+          <p:nvSpPr>
+            <p:cNvPr id="13" name="TextBox 12"/>
+            <p:cNvSpPr txBox="1"/>
+            <p:nvPr/>
+          </p:nvSpPr>
+          <p:spPr>
+            <a:xfrm>
+              <a:off x="1110959" y="2343528"/>
+              <a:ext cx="439544" cy="369332"/>
+            </a:xfrm>
+            <a:prstGeom prst="rect">
+              <a:avLst/>
+            </a:prstGeom>
+            <a:noFill/>
+          </p:spPr>
+          <p:txBody>
+            <a:bodyPr wrap="none" rtlCol="0">
+              <a:spAutoFit/>
+            </a:bodyPr>
+            <a:lstStyle/>
+            <a:p>
+              <a:r>
+                <a:rPr lang="en-US" dirty="0"/>
+                <a:t>NF</a:t>
+              </a:r>
+            </a:p>
+          </p:txBody>
+        </p:sp>
+      </p:grpSp>
+      <p:sp>
+        <p:nvSpPr>
+          <p:cNvPr id="15" name="TextBox 14"/>
+          <p:cNvSpPr txBox="1"/>
+          <p:nvPr/>
+        </p:nvSpPr>
+        <p:spPr>
+          <a:xfrm>
+            <a:off x="686891" y="1690688"/>
+            <a:ext cx="10312414" cy="923330"/>
+          </a:xfrm>
+          <a:prstGeom prst="rect">
+            <a:avLst/>
+          </a:prstGeom>
+          <a:noFill/>
+        </p:spPr>
+        <p:txBody>
+          <a:bodyPr wrap="square" rtlCol="0">
+            <a:spAutoFit/>
+          </a:bodyPr>
+          <a:lstStyle/>
+          <a:p>
+            <a:pPr marL="285750" indent="-285750">
+              <a:buFont typeface="Arial" panose="020B0604020202020204" pitchFamily="34" charset="0"/>
+              <a:buChar char="•"/>
+            </a:pPr>
+            <a:r>
+              <a:rPr lang="en-US" dirty="0"/>
+              <a:t>Post target acquisition Beta power (target acquisition on red vertical line)</a:t>
+            </a:r>
+          </a:p>
+          <a:p>
+            <a:pPr marL="285750" indent="-285750">
+              <a:buFont typeface="Arial" panose="020B0604020202020204" pitchFamily="34" charset="0"/>
+              <a:buChar char="•"/>
+            </a:pPr>
+            <a:r>
+              <a:rPr lang="en-US" dirty="0"/>
+              <a:t>After target acquisition, baseline beta power returns to mean followed by movement related desynchronization </a:t>
+            </a:r>
+          </a:p>
+        </p:txBody>
+      </p:sp>
+      <p:sp>
+        <p:nvSpPr>
+          <p:cNvPr id="16" name="TextBox 15"/>
+          <p:cNvSpPr txBox="1"/>
+          <p:nvPr/>
+        </p:nvSpPr>
+        <p:spPr>
+          <a:xfrm>
+            <a:off x="1843087" y="2796207"/>
+            <a:ext cx="868443" cy="369332"/>
+          </a:xfrm>
+          <a:prstGeom prst="rect">
+            <a:avLst/>
+          </a:prstGeom>
+          <a:noFill/>
+        </p:spPr>
+        <p:txBody>
+          <a:bodyPr wrap="none" rtlCol="0">
+            <a:spAutoFit/>
+          </a:bodyPr>
+          <a:lstStyle/>
+          <a:p>
+            <a:r>
+              <a:rPr lang="en-US" b="1" dirty="0"/>
+              <a:t>Patient</a:t>
+            </a:r>
+          </a:p>
+        </p:txBody>
+      </p:sp>
+      <p:sp>
+        <p:nvSpPr>
+          <p:cNvPr id="17" name="TextBox 16"/>
+          <p:cNvSpPr txBox="1"/>
+          <p:nvPr/>
+        </p:nvSpPr>
+        <p:spPr>
+          <a:xfrm>
+            <a:off x="6214831" y="2865332"/>
+            <a:ext cx="3276923" cy="369332"/>
+          </a:xfrm>
+          <a:prstGeom prst="rect">
+            <a:avLst/>
+          </a:prstGeom>
+          <a:noFill/>
+        </p:spPr>
+        <p:txBody>
+          <a:bodyPr wrap="none" rtlCol="0">
+            <a:spAutoFit/>
+          </a:bodyPr>
+          <a:lstStyle/>
+          <a:p>
+            <a:r>
+              <a:rPr lang="en-US" b="1" dirty="0"/>
+              <a:t>NHPs in Beta NF + Reaching Task</a:t>
+            </a:r>
+          </a:p>
+        </p:txBody>
+      </p:sp>
+    </p:spTree>
+    <p:extLst>
+      <p:ext uri="{BB962C8B-B14F-4D97-AF65-F5344CB8AC3E}">
+        <p14:creationId xmlns:p14="http://schemas.microsoft.com/office/powerpoint/2010/main" val="1271357544"/>
+      </p:ext>
+    </p:extLst>
+  </p:cSld>
+  <p:clrMapOvr>
+    <a:masterClrMapping/>
+  </p:clrMapOvr>
+</p:sld>
+</file>
+
 <file path=ppt/slides/slide2.xml><?xml version="1.0" encoding="utf-8"?>
 <p:sld xmlns:a="http://schemas.openxmlformats.org/drawingml/2006/main" xmlns:r="http://schemas.openxmlformats.org/officeDocument/2006/relationships" xmlns:p="http://schemas.openxmlformats.org/presentationml/2006/main">
   <p:cSld>
@@ -3587,11 +4073,7 @@
           <a:p>
             <a:r>
               <a:rPr lang="en-US" dirty="0"/>
-              <a:t>Beta Power Leading Up To </a:t>
-            </a:r>
-            <a:r>
-              <a:rPr lang="en-US" dirty="0"/>
-              <a:t>Target Acquisition</a:t>
+              <a:t>Beta Power Leading Up To Target Acquisition</a:t>
             </a:r>
           </a:p>
         </p:txBody>
@@ -3765,7 +4247,7 @@
         <p:spPr>
           <a:xfrm>
             <a:off x="7832036" y="2207212"/>
-            <a:ext cx="3657600" cy="2554545"/>
+            <a:ext cx="3657600" cy="3170099"/>
           </a:xfrm>
           <a:prstGeom prst="rect">
             <a:avLst/>
@@ -3805,6 +4287,21 @@
             <a:r>
               <a:rPr lang="en-US" sz="2000" dirty="0"/>
               <a:t>Separation in high/low beta power earlier before target acquisition </a:t>
+            </a:r>
+          </a:p>
+          <a:p>
+            <a:pPr marL="342900" indent="-342900">
+              <a:buAutoNum type="arabicParenR"/>
+            </a:pPr>
+            <a:endParaRPr lang="en-US" sz="2000" dirty="0"/>
+          </a:p>
+          <a:p>
+            <a:pPr marL="342900" indent="-342900">
+              <a:buAutoNum type="arabicParenR"/>
+            </a:pPr>
+            <a:r>
+              <a:rPr lang="en-US" sz="2000" dirty="0"/>
+              <a:t>Each trace starts at Beta = 0</a:t>
             </a:r>
           </a:p>
         </p:txBody>
@@ -3909,13 +4406,22 @@
         </p:spPr>
         <p:txBody>
           <a:bodyPr>
-            <a:normAutofit fontScale="92500" lnSpcReduction="20000"/>
+            <a:normAutofit fontScale="77500" lnSpcReduction="20000"/>
           </a:bodyPr>
           <a:lstStyle/>
           <a:p>
             <a:r>
               <a:rPr lang="en-US" dirty="0"/>
-              <a:t>Histograms of beta power channel activity 5 sec preceding high/low beta target, aggregated for each day</a:t>
+              <a:t>Histograms of beta power channel activity  5 sec preceding high/low beta target, aggregated for each day</a:t>
+            </a:r>
+          </a:p>
+          <a:p>
+            <a:endParaRPr lang="en-US" dirty="0"/>
+          </a:p>
+          <a:p>
+            <a:r>
+              <a:rPr lang="en-US" dirty="0"/>
+              <a:t>Each distribution has median of arm movement beta power subtracted</a:t>
             </a:r>
           </a:p>
           <a:p>
@@ -3987,7 +4493,6 @@
               <a:rPr lang="en-US" dirty="0"/>
               <a:t>Distribution of Beta Power 5 seconds Prior to High / Low Targets</a:t>
             </a:r>
-            <a:endParaRPr lang="en-US" dirty="0"/>
           </a:p>
         </p:txBody>
       </p:sp>
@@ -4145,16 +4650,43 @@
             <p:ph idx="1"/>
           </p:nvPr>
         </p:nvSpPr>
-        <p:spPr/>
-        <p:txBody>
-          <a:bodyPr/>
-          <a:lstStyle/>
-          <a:p>
-            <a:r>
-              <a:rPr lang="en-US"/>
-              <a:t>Baseline shifts in M1 </a:t>
-            </a:r>
+        <p:spPr>
+          <a:xfrm>
+            <a:off x="838200" y="1825625"/>
+            <a:ext cx="10669172" cy="4351338"/>
+          </a:xfrm>
+        </p:spPr>
+        <p:txBody>
+          <a:bodyPr/>
+          <a:lstStyle/>
+          <a:p>
+            <a:r>
+              <a:rPr lang="en-US" dirty="0"/>
+              <a:t>Sometimes she can do task well, then all of a sudden can’t anymore (e.g. Day 2, high target – see slide 3)</a:t>
+            </a:r>
+          </a:p>
+          <a:p>
             <a:endParaRPr lang="en-US" dirty="0"/>
+          </a:p>
+          <a:p>
+            <a:r>
+              <a:rPr lang="en-US" dirty="0"/>
+              <a:t>Assessed correlation between performance and baseline M1 / STN beta mean and variance</a:t>
+            </a:r>
+          </a:p>
+          <a:p>
+            <a:pPr lvl="1"/>
+            <a:r>
+              <a:rPr lang="en-US" dirty="0"/>
+              <a:t>Only use data from 2/6, 2/7, 2/8</a:t>
+            </a:r>
+          </a:p>
+          <a:p>
+            <a:pPr lvl="1"/>
+            <a:r>
+              <a:rPr lang="en-US" dirty="0"/>
+              <a:t>STN gain on 2/2, 2/3 was set higher and sometimes saturated</a:t>
+            </a:r>
           </a:p>
         </p:txBody>
       </p:sp>
@@ -4162,6 +4694,333 @@
     <p:extLst>
       <p:ext uri="{BB962C8B-B14F-4D97-AF65-F5344CB8AC3E}">
         <p14:creationId xmlns:p14="http://schemas.microsoft.com/office/powerpoint/2010/main" val="4096883558"/>
+      </p:ext>
+    </p:extLst>
+  </p:cSld>
+  <p:clrMapOvr>
+    <a:masterClrMapping/>
+  </p:clrMapOvr>
+</p:sld>
+</file>
+
+<file path=ppt/slides/slide8.xml><?xml version="1.0" encoding="utf-8"?>
+<p:sld xmlns:a="http://schemas.openxmlformats.org/drawingml/2006/main" xmlns:r="http://schemas.openxmlformats.org/officeDocument/2006/relationships" xmlns:p="http://schemas.openxmlformats.org/presentationml/2006/main">
+  <p:cSld>
+    <p:spTree>
+      <p:nvGrpSpPr>
+        <p:cNvPr id="1" name=""/>
+        <p:cNvGrpSpPr/>
+        <p:nvPr/>
+      </p:nvGrpSpPr>
+      <p:grpSpPr>
+        <a:xfrm>
+          <a:off x="0" y="0"/>
+          <a:ext cx="0" cy="0"/>
+          <a:chOff x="0" y="0"/>
+          <a:chExt cx="0" cy="0"/>
+        </a:xfrm>
+      </p:grpSpPr>
+      <p:sp>
+        <p:nvSpPr>
+          <p:cNvPr id="2" name="Title 1"/>
+          <p:cNvSpPr>
+            <a:spLocks noGrp="1"/>
+          </p:cNvSpPr>
+          <p:nvPr>
+            <p:ph type="title"/>
+          </p:nvPr>
+        </p:nvSpPr>
+        <p:spPr/>
+        <p:txBody>
+          <a:bodyPr/>
+          <a:lstStyle/>
+          <a:p>
+            <a:r>
+              <a:rPr lang="en-US" dirty="0"/>
+              <a:t>STN Power Mean and Variance vs. Time to Target</a:t>
+            </a:r>
+          </a:p>
+        </p:txBody>
+      </p:sp>
+      <p:pic>
+        <p:nvPicPr>
+          <p:cNvPr id="4" name="Picture 3"/>
+          <p:cNvPicPr>
+            <a:picLocks noChangeAspect="1"/>
+          </p:cNvPicPr>
+          <p:nvPr/>
+        </p:nvPicPr>
+        <p:blipFill>
+          <a:blip r:embed="rId2">
+            <a:extLst>
+              <a:ext uri="{28A0092B-C50C-407E-A947-70E740481C1C}">
+                <a14:useLocalDpi xmlns:a14="http://schemas.microsoft.com/office/drawing/2010/main" val="0"/>
+              </a:ext>
+            </a:extLst>
+          </a:blip>
+          <a:stretch>
+            <a:fillRect/>
+          </a:stretch>
+        </p:blipFill>
+        <p:spPr>
+          <a:xfrm>
+            <a:off x="838200" y="1866413"/>
+            <a:ext cx="5333333" cy="4000000"/>
+          </a:xfrm>
+          <a:prstGeom prst="rect">
+            <a:avLst/>
+          </a:prstGeom>
+        </p:spPr>
+      </p:pic>
+      <p:pic>
+        <p:nvPicPr>
+          <p:cNvPr id="5" name="Picture 4"/>
+          <p:cNvPicPr>
+            <a:picLocks noChangeAspect="1"/>
+          </p:cNvPicPr>
+          <p:nvPr/>
+        </p:nvPicPr>
+        <p:blipFill>
+          <a:blip r:embed="rId3">
+            <a:extLst>
+              <a:ext uri="{28A0092B-C50C-407E-A947-70E740481C1C}">
+                <a14:useLocalDpi xmlns:a14="http://schemas.microsoft.com/office/drawing/2010/main" val="0"/>
+              </a:ext>
+            </a:extLst>
+          </a:blip>
+          <a:stretch>
+            <a:fillRect/>
+          </a:stretch>
+        </p:blipFill>
+        <p:spPr>
+          <a:xfrm>
+            <a:off x="6361497" y="1866413"/>
+            <a:ext cx="5333333" cy="4000000"/>
+          </a:xfrm>
+          <a:prstGeom prst="rect">
+            <a:avLst/>
+          </a:prstGeom>
+        </p:spPr>
+      </p:pic>
+      <p:sp>
+        <p:nvSpPr>
+          <p:cNvPr id="6" name="TextBox 5"/>
+          <p:cNvSpPr txBox="1"/>
+          <p:nvPr/>
+        </p:nvSpPr>
+        <p:spPr>
+          <a:xfrm>
+            <a:off x="838200" y="6041285"/>
+            <a:ext cx="10966207" cy="646331"/>
+          </a:xfrm>
+          <a:prstGeom prst="rect">
+            <a:avLst/>
+          </a:prstGeom>
+          <a:noFill/>
+        </p:spPr>
+        <p:txBody>
+          <a:bodyPr wrap="none" rtlCol="0">
+            <a:spAutoFit/>
+          </a:bodyPr>
+          <a:lstStyle/>
+          <a:p>
+            <a:r>
+              <a:rPr lang="en-US" dirty="0"/>
+              <a:t>- Each point represents 2.5 minutes – mean time to target within window vs. STN power or STN variance in window</a:t>
+            </a:r>
+          </a:p>
+          <a:p>
+            <a:r>
+              <a:rPr lang="en-US" dirty="0"/>
+              <a:t>- Currently unclear if high STN power or high STN variance correlates with better performance. </a:t>
+            </a:r>
+          </a:p>
+        </p:txBody>
+      </p:sp>
+    </p:spTree>
+    <p:extLst>
+      <p:ext uri="{BB962C8B-B14F-4D97-AF65-F5344CB8AC3E}">
+        <p14:creationId xmlns:p14="http://schemas.microsoft.com/office/powerpoint/2010/main" val="3771441322"/>
+      </p:ext>
+    </p:extLst>
+  </p:cSld>
+  <p:clrMapOvr>
+    <a:masterClrMapping/>
+  </p:clrMapOvr>
+</p:sld>
+</file>
+
+<file path=ppt/slides/slide9.xml><?xml version="1.0" encoding="utf-8"?>
+<p:sld xmlns:a="http://schemas.openxmlformats.org/drawingml/2006/main" xmlns:r="http://schemas.openxmlformats.org/officeDocument/2006/relationships" xmlns:p="http://schemas.openxmlformats.org/presentationml/2006/main">
+  <p:cSld>
+    <p:spTree>
+      <p:nvGrpSpPr>
+        <p:cNvPr id="1" name=""/>
+        <p:cNvGrpSpPr/>
+        <p:nvPr/>
+      </p:nvGrpSpPr>
+      <p:grpSpPr>
+        <a:xfrm>
+          <a:off x="0" y="0"/>
+          <a:ext cx="0" cy="0"/>
+          <a:chOff x="0" y="0"/>
+          <a:chExt cx="0" cy="0"/>
+        </a:xfrm>
+      </p:grpSpPr>
+      <p:sp>
+        <p:nvSpPr>
+          <p:cNvPr id="2" name="Title 1"/>
+          <p:cNvSpPr>
+            <a:spLocks noGrp="1"/>
+          </p:cNvSpPr>
+          <p:nvPr>
+            <p:ph type="title"/>
+          </p:nvPr>
+        </p:nvSpPr>
+        <p:spPr>
+          <a:xfrm>
+            <a:off x="798444" y="192846"/>
+            <a:ext cx="10515600" cy="1325563"/>
+          </a:xfrm>
+        </p:spPr>
+        <p:txBody>
+          <a:bodyPr/>
+          <a:lstStyle/>
+          <a:p>
+            <a:r>
+              <a:rPr lang="en-US" dirty="0"/>
+              <a:t>STN Power Variance vs. M1 Power</a:t>
+            </a:r>
+          </a:p>
+        </p:txBody>
+      </p:sp>
+      <p:pic>
+        <p:nvPicPr>
+          <p:cNvPr id="6" name="Picture 5"/>
+          <p:cNvPicPr>
+            <a:picLocks noChangeAspect="1"/>
+          </p:cNvPicPr>
+          <p:nvPr/>
+        </p:nvPicPr>
+        <p:blipFill>
+          <a:blip r:embed="rId2">
+            <a:extLst>
+              <a:ext uri="{28A0092B-C50C-407E-A947-70E740481C1C}">
+                <a14:useLocalDpi xmlns:a14="http://schemas.microsoft.com/office/drawing/2010/main" val="0"/>
+              </a:ext>
+            </a:extLst>
+          </a:blip>
+          <a:stretch>
+            <a:fillRect/>
+          </a:stretch>
+        </p:blipFill>
+        <p:spPr>
+          <a:xfrm>
+            <a:off x="550633" y="1173853"/>
+            <a:ext cx="5333333" cy="4000000"/>
+          </a:xfrm>
+          <a:prstGeom prst="rect">
+            <a:avLst/>
+          </a:prstGeom>
+        </p:spPr>
+      </p:pic>
+      <p:pic>
+        <p:nvPicPr>
+          <p:cNvPr id="8" name="Picture 7"/>
+          <p:cNvPicPr>
+            <a:picLocks noChangeAspect="1"/>
+          </p:cNvPicPr>
+          <p:nvPr/>
+        </p:nvPicPr>
+        <p:blipFill>
+          <a:blip r:embed="rId3">
+            <a:extLst>
+              <a:ext uri="{28A0092B-C50C-407E-A947-70E740481C1C}">
+                <a14:useLocalDpi xmlns:a14="http://schemas.microsoft.com/office/drawing/2010/main" val="0"/>
+              </a:ext>
+            </a:extLst>
+          </a:blip>
+          <a:stretch>
+            <a:fillRect/>
+          </a:stretch>
+        </p:blipFill>
+        <p:spPr>
+          <a:xfrm>
+            <a:off x="6056244" y="1173853"/>
+            <a:ext cx="5038095" cy="4000000"/>
+          </a:xfrm>
+          <a:prstGeom prst="rect">
+            <a:avLst/>
+          </a:prstGeom>
+        </p:spPr>
+      </p:pic>
+      <p:sp>
+        <p:nvSpPr>
+          <p:cNvPr id="9" name="TextBox 8"/>
+          <p:cNvSpPr txBox="1"/>
+          <p:nvPr/>
+        </p:nvSpPr>
+        <p:spPr>
+          <a:xfrm>
+            <a:off x="1434545" y="5418432"/>
+            <a:ext cx="9879499" cy="1200329"/>
+          </a:xfrm>
+          <a:prstGeom prst="rect">
+            <a:avLst/>
+          </a:prstGeom>
+          <a:noFill/>
+        </p:spPr>
+        <p:txBody>
+          <a:bodyPr wrap="none" rtlCol="0">
+            <a:spAutoFit/>
+          </a:bodyPr>
+          <a:lstStyle/>
+          <a:p>
+            <a:pPr marL="285750" indent="-285750">
+              <a:buFontTx/>
+              <a:buChar char="-"/>
+            </a:pPr>
+            <a:r>
+              <a:rPr lang="en-US" dirty="0"/>
+              <a:t>Each point represents 2.5 minutes</a:t>
+            </a:r>
+          </a:p>
+          <a:p>
+            <a:pPr marL="285750" indent="-285750">
+              <a:buFontTx/>
+              <a:buChar char="-"/>
+            </a:pPr>
+            <a:r>
+              <a:rPr lang="en-US" dirty="0"/>
+              <a:t>STN variance is correlated with lower M1 beta power</a:t>
+            </a:r>
+          </a:p>
+          <a:p>
+            <a:pPr marL="742950" lvl="1" indent="-285750">
+              <a:buFontTx/>
+              <a:buChar char="-"/>
+            </a:pPr>
+            <a:r>
+              <a:rPr lang="en-US" dirty="0"/>
+              <a:t> Maybe higher STN variance allows easier desynchronization – easier to get to lower beta target</a:t>
+            </a:r>
+          </a:p>
+          <a:p>
+            <a:pPr marL="285750" indent="-285750">
+              <a:buFontTx/>
+              <a:buChar char="-"/>
+            </a:pPr>
+            <a:r>
+              <a:rPr lang="en-US" dirty="0"/>
+              <a:t>STN variance not correlated with M1 variance</a:t>
+            </a:r>
+          </a:p>
+        </p:txBody>
+      </p:sp>
+    </p:spTree>
+    <p:extLst>
+      <p:ext uri="{BB962C8B-B14F-4D97-AF65-F5344CB8AC3E}">
+        <p14:creationId xmlns:p14="http://schemas.microsoft.com/office/powerpoint/2010/main" val="1920692780"/>
       </p:ext>
     </p:extLst>
   </p:cSld>

</xml_diff>